<commit_message>
writeup is roughly complete
</commit_message>
<xml_diff>
--- a/fig.pptx
+++ b/fig.pptx
@@ -36845,11 +36845,17 @@
           </a:fontRef>
         </p:style>
         <p:txBody>
-          <a:bodyPr rtlCol="0" anchor="ctr"/>
+          <a:bodyPr lIns="0" tIns="0" rIns="0" bIns="0" rtlCol="0" anchor="ctr" anchorCtr="1"/>
           <a:lstStyle/>
           <a:p>
             <a:pPr algn="ctr"/>
-            <a:endParaRPr lang="en-US" dirty="0" err="1"/>
+            <a:endParaRPr lang="en-US" sz="1600" baseline="-25000" dirty="0">
+              <a:solidFill>
+                <a:schemeClr val="tx1"/>
+              </a:solidFill>
+              <a:latin typeface="Times New Roman" panose="02020603050405020304" pitchFamily="18" charset="0"/>
+              <a:cs typeface="Times New Roman" panose="02020603050405020304" pitchFamily="18" charset="0"/>
+            </a:endParaRPr>
           </a:p>
         </p:txBody>
       </p:sp>
@@ -36949,11 +36955,17 @@
           </a:fontRef>
         </p:style>
         <p:txBody>
-          <a:bodyPr rtlCol="0" anchor="ctr"/>
+          <a:bodyPr rtlCol="0" anchor="ctr" anchorCtr="1"/>
           <a:lstStyle/>
           <a:p>
             <a:pPr algn="ctr"/>
-            <a:endParaRPr lang="en-US" dirty="0" err="1"/>
+            <a:endParaRPr lang="en-US" sz="1600" baseline="-25000" dirty="0">
+              <a:solidFill>
+                <a:schemeClr val="tx1"/>
+              </a:solidFill>
+              <a:latin typeface="Times New Roman" panose="02020603050405020304" pitchFamily="18" charset="0"/>
+              <a:cs typeface="Times New Roman" panose="02020603050405020304" pitchFamily="18" charset="0"/>
+            </a:endParaRPr>
           </a:p>
         </p:txBody>
       </p:sp>
@@ -37001,11 +37013,17 @@
           </a:fontRef>
         </p:style>
         <p:txBody>
-          <a:bodyPr rtlCol="0" anchor="ctr"/>
+          <a:bodyPr rtlCol="0" anchor="ctr" anchorCtr="1"/>
           <a:lstStyle/>
           <a:p>
             <a:pPr algn="ctr"/>
-            <a:endParaRPr lang="en-US" dirty="0" err="1"/>
+            <a:endParaRPr lang="en-US" sz="1600" baseline="-25000" dirty="0">
+              <a:solidFill>
+                <a:schemeClr val="tx1"/>
+              </a:solidFill>
+              <a:latin typeface="Times New Roman" panose="02020603050405020304" pitchFamily="18" charset="0"/>
+              <a:cs typeface="Times New Roman" panose="02020603050405020304" pitchFamily="18" charset="0"/>
+            </a:endParaRPr>
           </a:p>
         </p:txBody>
       </p:sp>
@@ -37053,11 +37071,17 @@
           </a:fontRef>
         </p:style>
         <p:txBody>
-          <a:bodyPr rtlCol="0" anchor="ctr"/>
+          <a:bodyPr rtlCol="0" anchor="ctr" anchorCtr="1"/>
           <a:lstStyle/>
           <a:p>
             <a:pPr algn="ctr"/>
-            <a:endParaRPr lang="en-US" dirty="0" err="1"/>
+            <a:endParaRPr lang="en-US" sz="1600" baseline="-25000" dirty="0">
+              <a:solidFill>
+                <a:schemeClr val="tx1"/>
+              </a:solidFill>
+              <a:latin typeface="Times New Roman" panose="02020603050405020304" pitchFamily="18" charset="0"/>
+              <a:cs typeface="Times New Roman" panose="02020603050405020304" pitchFamily="18" charset="0"/>
+            </a:endParaRPr>
           </a:p>
         </p:txBody>
       </p:sp>
@@ -37071,6 +37095,7 @@
             </a:extLst>
           </p:cNvPr>
           <p:cNvCxnSpPr>
+            <a:cxnSpLocks/>
             <a:stCxn id="27" idx="6"/>
             <a:endCxn id="28" idx="1"/>
           </p:cNvCxnSpPr>
@@ -37297,7 +37322,16 @@
           <a:lstStyle/>
           <a:p>
             <a:pPr algn="ctr"/>
-            <a:endParaRPr lang="en-US" dirty="0" err="1"/>
+            <a:r>
+              <a:rPr lang="en-US" i="1" dirty="0">
+                <a:solidFill>
+                  <a:schemeClr val="tx1"/>
+                </a:solidFill>
+                <a:latin typeface="Times New Roman" panose="02020603050405020304" pitchFamily="18" charset="0"/>
+                <a:cs typeface="Times New Roman" panose="02020603050405020304" pitchFamily="18" charset="0"/>
+              </a:rPr>
+              <a:t>x</a:t>
+            </a:r>
           </a:p>
         </p:txBody>
       </p:sp>
@@ -38059,6 +38093,702 @@
           </a:fontRef>
         </p:style>
       </p:cxnSp>
+      <p:sp>
+        <p:nvSpPr>
+          <p:cNvPr id="2" name="Oval 1">
+            <a:extLst>
+              <a:ext uri="{FF2B5EF4-FFF2-40B4-BE49-F238E27FC236}">
+                <a16:creationId xmlns:a16="http://schemas.microsoft.com/office/drawing/2014/main" id="{3EB921F7-EB1A-4E72-A05B-C69C46F9BE1B}"/>
+              </a:ext>
+            </a:extLst>
+          </p:cNvPr>
+          <p:cNvSpPr/>
+          <p:nvPr/>
+        </p:nvSpPr>
+        <p:spPr>
+          <a:xfrm>
+            <a:off x="8881145" y="634482"/>
+            <a:ext cx="2397967" cy="5486400"/>
+          </a:xfrm>
+          <a:prstGeom prst="ellipse">
+            <a:avLst/>
+          </a:prstGeom>
+          <a:noFill/>
+          <a:ln>
+            <a:solidFill>
+              <a:schemeClr val="tx1"/>
+            </a:solidFill>
+          </a:ln>
+        </p:spPr>
+        <p:style>
+          <a:lnRef idx="2">
+            <a:schemeClr val="accent1">
+              <a:shade val="50000"/>
+            </a:schemeClr>
+          </a:lnRef>
+          <a:fillRef idx="1">
+            <a:schemeClr val="accent1"/>
+          </a:fillRef>
+          <a:effectRef idx="0">
+            <a:schemeClr val="accent1"/>
+          </a:effectRef>
+          <a:fontRef idx="minor">
+            <a:schemeClr val="lt1"/>
+          </a:fontRef>
+        </p:style>
+        <p:txBody>
+          <a:bodyPr rtlCol="0" anchor="ctr"/>
+          <a:lstStyle/>
+          <a:p>
+            <a:pPr algn="ctr"/>
+            <a:endParaRPr lang="en-US" dirty="0" err="1"/>
+          </a:p>
+        </p:txBody>
+      </p:sp>
+      <p:sp>
+        <p:nvSpPr>
+          <p:cNvPr id="3" name="TextBox 2">
+            <a:extLst>
+              <a:ext uri="{FF2B5EF4-FFF2-40B4-BE49-F238E27FC236}">
+                <a16:creationId xmlns:a16="http://schemas.microsoft.com/office/drawing/2014/main" id="{86B9ED99-57CD-4E2E-BADF-8C7C00015DF8}"/>
+              </a:ext>
+            </a:extLst>
+          </p:cNvPr>
+          <p:cNvSpPr txBox="1"/>
+          <p:nvPr/>
+        </p:nvSpPr>
+        <p:spPr>
+          <a:xfrm>
+            <a:off x="9511289" y="5177350"/>
+            <a:ext cx="1137678" cy="418576"/>
+          </a:xfrm>
+          <a:prstGeom prst="rect">
+            <a:avLst/>
+          </a:prstGeom>
+          <a:noFill/>
+          <a:ln>
+            <a:noFill/>
+          </a:ln>
+        </p:spPr>
+        <p:txBody>
+          <a:bodyPr wrap="square" lIns="137160" tIns="91440" rIns="0" bIns="91440" rtlCol="0">
+            <a:spAutoFit/>
+          </a:bodyPr>
+          <a:lstStyle/>
+          <a:p>
+            <a:pPr algn="l">
+              <a:lnSpc>
+                <a:spcPct val="95000"/>
+              </a:lnSpc>
+              <a:spcBef>
+                <a:spcPts val="1200"/>
+              </a:spcBef>
+            </a:pPr>
+            <a:r>
+              <a:rPr lang="en-US" sz="1600" dirty="0">
+                <a:solidFill>
+                  <a:schemeClr val="tx1"/>
+                </a:solidFill>
+                <a:latin typeface="Times New Roman" panose="02020603050405020304" pitchFamily="18" charset="0"/>
+                <a:cs typeface="Times New Roman" panose="02020603050405020304" pitchFamily="18" charset="0"/>
+              </a:rPr>
+              <a:t>Span(</a:t>
+            </a:r>
+            <a:r>
+              <a:rPr lang="en-US" sz="1600" i="1" dirty="0">
+                <a:solidFill>
+                  <a:schemeClr val="tx1"/>
+                </a:solidFill>
+                <a:latin typeface="Times New Roman" panose="02020603050405020304" pitchFamily="18" charset="0"/>
+                <a:cs typeface="Times New Roman" panose="02020603050405020304" pitchFamily="18" charset="0"/>
+              </a:rPr>
+              <a:t>H</a:t>
+            </a:r>
+            <a:r>
+              <a:rPr lang="en-US" sz="1600" i="1" baseline="-25000" dirty="0">
+                <a:solidFill>
+                  <a:schemeClr val="tx1"/>
+                </a:solidFill>
+                <a:latin typeface="Times New Roman" panose="02020603050405020304" pitchFamily="18" charset="0"/>
+                <a:cs typeface="Times New Roman" panose="02020603050405020304" pitchFamily="18" charset="0"/>
+              </a:rPr>
+              <a:t>p</a:t>
+            </a:r>
+            <a:r>
+              <a:rPr lang="en-US" sz="1600" baseline="-25000" dirty="0">
+                <a:solidFill>
+                  <a:schemeClr val="tx1"/>
+                </a:solidFill>
+                <a:latin typeface="Times New Roman" panose="02020603050405020304" pitchFamily="18" charset="0"/>
+                <a:cs typeface="Times New Roman" panose="02020603050405020304" pitchFamily="18" charset="0"/>
+              </a:rPr>
+              <a:t>-1</a:t>
+            </a:r>
+            <a:r>
+              <a:rPr lang="en-US" sz="1600" dirty="0">
+                <a:solidFill>
+                  <a:schemeClr val="tx1"/>
+                </a:solidFill>
+                <a:latin typeface="Times New Roman" panose="02020603050405020304" pitchFamily="18" charset="0"/>
+                <a:cs typeface="Times New Roman" panose="02020603050405020304" pitchFamily="18" charset="0"/>
+              </a:rPr>
+              <a:t>)</a:t>
+            </a:r>
+          </a:p>
+        </p:txBody>
+      </p:sp>
+      <p:sp>
+        <p:nvSpPr>
+          <p:cNvPr id="58" name="TextBox 57">
+            <a:extLst>
+              <a:ext uri="{FF2B5EF4-FFF2-40B4-BE49-F238E27FC236}">
+                <a16:creationId xmlns:a16="http://schemas.microsoft.com/office/drawing/2014/main" id="{C38640EF-AD0D-4190-AC83-C088FE8395DC}"/>
+              </a:ext>
+            </a:extLst>
+          </p:cNvPr>
+          <p:cNvSpPr txBox="1"/>
+          <p:nvPr/>
+        </p:nvSpPr>
+        <p:spPr>
+          <a:xfrm>
+            <a:off x="5004804" y="1846113"/>
+            <a:ext cx="479143" cy="418576"/>
+          </a:xfrm>
+          <a:prstGeom prst="rect">
+            <a:avLst/>
+          </a:prstGeom>
+          <a:noFill/>
+          <a:ln>
+            <a:noFill/>
+          </a:ln>
+        </p:spPr>
+        <p:txBody>
+          <a:bodyPr wrap="square" lIns="137160" tIns="91440" rIns="0" bIns="91440" rtlCol="0">
+            <a:spAutoFit/>
+          </a:bodyPr>
+          <a:lstStyle/>
+          <a:p>
+            <a:pPr algn="l">
+              <a:lnSpc>
+                <a:spcPct val="95000"/>
+              </a:lnSpc>
+              <a:spcBef>
+                <a:spcPts val="1200"/>
+              </a:spcBef>
+            </a:pPr>
+            <a:r>
+              <a:rPr lang="en-US" sz="1600" i="1" dirty="0">
+                <a:solidFill>
+                  <a:schemeClr val="tx1"/>
+                </a:solidFill>
+                <a:latin typeface="Times New Roman" panose="02020603050405020304" pitchFamily="18" charset="0"/>
+                <a:cs typeface="Times New Roman" panose="02020603050405020304" pitchFamily="18" charset="0"/>
+              </a:rPr>
+              <a:t>x</a:t>
+            </a:r>
+            <a:r>
+              <a:rPr lang="en-US" sz="1600" baseline="-25000" dirty="0">
+                <a:solidFill>
+                  <a:schemeClr val="tx1"/>
+                </a:solidFill>
+                <a:latin typeface="Times New Roman" panose="02020603050405020304" pitchFamily="18" charset="0"/>
+                <a:cs typeface="Times New Roman" panose="02020603050405020304" pitchFamily="18" charset="0"/>
+              </a:rPr>
+              <a:t>1</a:t>
+            </a:r>
+            <a:endParaRPr lang="en-US" sz="1600" dirty="0">
+              <a:solidFill>
+                <a:schemeClr val="tx1"/>
+              </a:solidFill>
+              <a:latin typeface="Times New Roman" panose="02020603050405020304" pitchFamily="18" charset="0"/>
+              <a:cs typeface="Times New Roman" panose="02020603050405020304" pitchFamily="18" charset="0"/>
+            </a:endParaRPr>
+          </a:p>
+        </p:txBody>
+      </p:sp>
+      <p:sp>
+        <p:nvSpPr>
+          <p:cNvPr id="60" name="TextBox 59">
+            <a:extLst>
+              <a:ext uri="{FF2B5EF4-FFF2-40B4-BE49-F238E27FC236}">
+                <a16:creationId xmlns:a16="http://schemas.microsoft.com/office/drawing/2014/main" id="{E2F12882-68E7-4081-BA72-68AE51D70F92}"/>
+              </a:ext>
+            </a:extLst>
+          </p:cNvPr>
+          <p:cNvSpPr txBox="1"/>
+          <p:nvPr/>
+        </p:nvSpPr>
+        <p:spPr>
+          <a:xfrm>
+            <a:off x="5013334" y="2654078"/>
+            <a:ext cx="479143" cy="418576"/>
+          </a:xfrm>
+          <a:prstGeom prst="rect">
+            <a:avLst/>
+          </a:prstGeom>
+          <a:noFill/>
+          <a:ln>
+            <a:noFill/>
+          </a:ln>
+        </p:spPr>
+        <p:txBody>
+          <a:bodyPr wrap="square" lIns="137160" tIns="91440" rIns="0" bIns="91440" rtlCol="0">
+            <a:spAutoFit/>
+          </a:bodyPr>
+          <a:lstStyle/>
+          <a:p>
+            <a:pPr algn="l">
+              <a:lnSpc>
+                <a:spcPct val="95000"/>
+              </a:lnSpc>
+              <a:spcBef>
+                <a:spcPts val="1200"/>
+              </a:spcBef>
+            </a:pPr>
+            <a:r>
+              <a:rPr lang="en-US" sz="1600" i="1" dirty="0">
+                <a:solidFill>
+                  <a:schemeClr val="tx1"/>
+                </a:solidFill>
+                <a:latin typeface="Times New Roman" panose="02020603050405020304" pitchFamily="18" charset="0"/>
+                <a:cs typeface="Times New Roman" panose="02020603050405020304" pitchFamily="18" charset="0"/>
+              </a:rPr>
+              <a:t>x</a:t>
+            </a:r>
+            <a:r>
+              <a:rPr lang="en-US" sz="1600" baseline="-25000" dirty="0">
+                <a:solidFill>
+                  <a:schemeClr val="tx1"/>
+                </a:solidFill>
+                <a:latin typeface="Times New Roman" panose="02020603050405020304" pitchFamily="18" charset="0"/>
+                <a:cs typeface="Times New Roman" panose="02020603050405020304" pitchFamily="18" charset="0"/>
+              </a:rPr>
+              <a:t>2</a:t>
+            </a:r>
+            <a:endParaRPr lang="en-US" sz="1600" dirty="0">
+              <a:solidFill>
+                <a:schemeClr val="tx1"/>
+              </a:solidFill>
+              <a:latin typeface="Times New Roman" panose="02020603050405020304" pitchFamily="18" charset="0"/>
+              <a:cs typeface="Times New Roman" panose="02020603050405020304" pitchFamily="18" charset="0"/>
+            </a:endParaRPr>
+          </a:p>
+        </p:txBody>
+      </p:sp>
+      <p:sp>
+        <p:nvSpPr>
+          <p:cNvPr id="62" name="TextBox 61">
+            <a:extLst>
+              <a:ext uri="{FF2B5EF4-FFF2-40B4-BE49-F238E27FC236}">
+                <a16:creationId xmlns:a16="http://schemas.microsoft.com/office/drawing/2014/main" id="{DDB64BA1-3C2D-4868-A2BF-12401265AFD0}"/>
+              </a:ext>
+            </a:extLst>
+          </p:cNvPr>
+          <p:cNvSpPr txBox="1"/>
+          <p:nvPr/>
+        </p:nvSpPr>
+        <p:spPr>
+          <a:xfrm>
+            <a:off x="4997784" y="3431657"/>
+            <a:ext cx="479143" cy="418576"/>
+          </a:xfrm>
+          <a:prstGeom prst="rect">
+            <a:avLst/>
+          </a:prstGeom>
+          <a:noFill/>
+          <a:ln>
+            <a:noFill/>
+          </a:ln>
+        </p:spPr>
+        <p:txBody>
+          <a:bodyPr wrap="square" lIns="137160" tIns="91440" rIns="0" bIns="91440" rtlCol="0">
+            <a:spAutoFit/>
+          </a:bodyPr>
+          <a:lstStyle/>
+          <a:p>
+            <a:pPr algn="l">
+              <a:lnSpc>
+                <a:spcPct val="95000"/>
+              </a:lnSpc>
+              <a:spcBef>
+                <a:spcPts val="1200"/>
+              </a:spcBef>
+            </a:pPr>
+            <a:r>
+              <a:rPr lang="en-US" sz="1600" i="1" dirty="0">
+                <a:solidFill>
+                  <a:schemeClr val="tx1"/>
+                </a:solidFill>
+                <a:latin typeface="Times New Roman" panose="02020603050405020304" pitchFamily="18" charset="0"/>
+                <a:cs typeface="Times New Roman" panose="02020603050405020304" pitchFamily="18" charset="0"/>
+              </a:rPr>
+              <a:t>x</a:t>
+            </a:r>
+            <a:r>
+              <a:rPr lang="en-US" sz="1600" baseline="-25000" dirty="0">
+                <a:solidFill>
+                  <a:schemeClr val="tx1"/>
+                </a:solidFill>
+                <a:latin typeface="Times New Roman" panose="02020603050405020304" pitchFamily="18" charset="0"/>
+                <a:cs typeface="Times New Roman" panose="02020603050405020304" pitchFamily="18" charset="0"/>
+              </a:rPr>
+              <a:t>3</a:t>
+            </a:r>
+            <a:endParaRPr lang="en-US" sz="1600" dirty="0">
+              <a:solidFill>
+                <a:schemeClr val="tx1"/>
+              </a:solidFill>
+              <a:latin typeface="Times New Roman" panose="02020603050405020304" pitchFamily="18" charset="0"/>
+              <a:cs typeface="Times New Roman" panose="02020603050405020304" pitchFamily="18" charset="0"/>
+            </a:endParaRPr>
+          </a:p>
+        </p:txBody>
+      </p:sp>
+      <p:sp>
+        <p:nvSpPr>
+          <p:cNvPr id="64" name="TextBox 63">
+            <a:extLst>
+              <a:ext uri="{FF2B5EF4-FFF2-40B4-BE49-F238E27FC236}">
+                <a16:creationId xmlns:a16="http://schemas.microsoft.com/office/drawing/2014/main" id="{9AD465C1-4CC8-4A63-BD90-F9D16C7DB780}"/>
+              </a:ext>
+            </a:extLst>
+          </p:cNvPr>
+          <p:cNvSpPr txBox="1"/>
+          <p:nvPr/>
+        </p:nvSpPr>
+        <p:spPr>
+          <a:xfrm>
+            <a:off x="5013335" y="4194087"/>
+            <a:ext cx="479143" cy="418576"/>
+          </a:xfrm>
+          <a:prstGeom prst="rect">
+            <a:avLst/>
+          </a:prstGeom>
+          <a:noFill/>
+          <a:ln>
+            <a:noFill/>
+          </a:ln>
+        </p:spPr>
+        <p:txBody>
+          <a:bodyPr wrap="square" lIns="137160" tIns="91440" rIns="0" bIns="91440" rtlCol="0">
+            <a:spAutoFit/>
+          </a:bodyPr>
+          <a:lstStyle/>
+          <a:p>
+            <a:pPr algn="l">
+              <a:lnSpc>
+                <a:spcPct val="95000"/>
+              </a:lnSpc>
+              <a:spcBef>
+                <a:spcPts val="1200"/>
+              </a:spcBef>
+            </a:pPr>
+            <a:r>
+              <a:rPr lang="en-US" sz="1600" i="1" dirty="0" err="1">
+                <a:solidFill>
+                  <a:schemeClr val="tx1"/>
+                </a:solidFill>
+                <a:latin typeface="Times New Roman" panose="02020603050405020304" pitchFamily="18" charset="0"/>
+                <a:cs typeface="Times New Roman" panose="02020603050405020304" pitchFamily="18" charset="0"/>
+              </a:rPr>
+              <a:t>x</a:t>
+            </a:r>
+            <a:r>
+              <a:rPr lang="en-US" sz="1600" i="1" baseline="-25000" dirty="0" err="1">
+                <a:solidFill>
+                  <a:schemeClr val="tx1"/>
+                </a:solidFill>
+                <a:latin typeface="Times New Roman" panose="02020603050405020304" pitchFamily="18" charset="0"/>
+                <a:cs typeface="Times New Roman" panose="02020603050405020304" pitchFamily="18" charset="0"/>
+              </a:rPr>
+              <a:t>g</a:t>
+            </a:r>
+            <a:endParaRPr lang="en-US" sz="1600" i="1" dirty="0">
+              <a:solidFill>
+                <a:schemeClr val="tx1"/>
+              </a:solidFill>
+              <a:latin typeface="Times New Roman" panose="02020603050405020304" pitchFamily="18" charset="0"/>
+              <a:cs typeface="Times New Roman" panose="02020603050405020304" pitchFamily="18" charset="0"/>
+            </a:endParaRPr>
+          </a:p>
+        </p:txBody>
+      </p:sp>
+      <p:sp>
+        <p:nvSpPr>
+          <p:cNvPr id="66" name="TextBox 65">
+            <a:extLst>
+              <a:ext uri="{FF2B5EF4-FFF2-40B4-BE49-F238E27FC236}">
+                <a16:creationId xmlns:a16="http://schemas.microsoft.com/office/drawing/2014/main" id="{378A7D88-A667-4970-A8CB-4CC5B0C00111}"/>
+              </a:ext>
+            </a:extLst>
+          </p:cNvPr>
+          <p:cNvSpPr txBox="1"/>
+          <p:nvPr/>
+        </p:nvSpPr>
+        <p:spPr>
+          <a:xfrm>
+            <a:off x="1260174" y="1838588"/>
+            <a:ext cx="479143" cy="418576"/>
+          </a:xfrm>
+          <a:prstGeom prst="rect">
+            <a:avLst/>
+          </a:prstGeom>
+          <a:noFill/>
+          <a:ln>
+            <a:noFill/>
+          </a:ln>
+        </p:spPr>
+        <p:txBody>
+          <a:bodyPr wrap="square" lIns="137160" tIns="91440" rIns="0" bIns="91440" rtlCol="0">
+            <a:spAutoFit/>
+          </a:bodyPr>
+          <a:lstStyle/>
+          <a:p>
+            <a:pPr algn="l">
+              <a:lnSpc>
+                <a:spcPct val="95000"/>
+              </a:lnSpc>
+              <a:spcBef>
+                <a:spcPts val="1200"/>
+              </a:spcBef>
+            </a:pPr>
+            <a:r>
+              <a:rPr lang="en-US" sz="1600" i="1" dirty="0">
+                <a:solidFill>
+                  <a:schemeClr val="tx1"/>
+                </a:solidFill>
+                <a:latin typeface="Times New Roman" panose="02020603050405020304" pitchFamily="18" charset="0"/>
+                <a:cs typeface="Times New Roman" panose="02020603050405020304" pitchFamily="18" charset="0"/>
+              </a:rPr>
+              <a:t>x</a:t>
+            </a:r>
+            <a:r>
+              <a:rPr lang="en-US" sz="1600" baseline="-25000" dirty="0">
+                <a:solidFill>
+                  <a:schemeClr val="tx1"/>
+                </a:solidFill>
+                <a:latin typeface="Times New Roman" panose="02020603050405020304" pitchFamily="18" charset="0"/>
+                <a:cs typeface="Times New Roman" panose="02020603050405020304" pitchFamily="18" charset="0"/>
+              </a:rPr>
+              <a:t>1</a:t>
+            </a:r>
+            <a:endParaRPr lang="en-US" sz="1600" dirty="0">
+              <a:solidFill>
+                <a:schemeClr val="tx1"/>
+              </a:solidFill>
+              <a:latin typeface="Times New Roman" panose="02020603050405020304" pitchFamily="18" charset="0"/>
+              <a:cs typeface="Times New Roman" panose="02020603050405020304" pitchFamily="18" charset="0"/>
+            </a:endParaRPr>
+          </a:p>
+        </p:txBody>
+      </p:sp>
+      <p:sp>
+        <p:nvSpPr>
+          <p:cNvPr id="68" name="TextBox 67">
+            <a:extLst>
+              <a:ext uri="{FF2B5EF4-FFF2-40B4-BE49-F238E27FC236}">
+                <a16:creationId xmlns:a16="http://schemas.microsoft.com/office/drawing/2014/main" id="{F42BBC0B-E0EC-44C9-9E1B-FBB1AA92C98B}"/>
+              </a:ext>
+            </a:extLst>
+          </p:cNvPr>
+          <p:cNvSpPr txBox="1"/>
+          <p:nvPr/>
+        </p:nvSpPr>
+        <p:spPr>
+          <a:xfrm>
+            <a:off x="1253668" y="2625230"/>
+            <a:ext cx="479143" cy="418576"/>
+          </a:xfrm>
+          <a:prstGeom prst="rect">
+            <a:avLst/>
+          </a:prstGeom>
+          <a:noFill/>
+          <a:ln>
+            <a:noFill/>
+          </a:ln>
+        </p:spPr>
+        <p:txBody>
+          <a:bodyPr wrap="square" lIns="137160" tIns="91440" rIns="0" bIns="91440" rtlCol="0">
+            <a:spAutoFit/>
+          </a:bodyPr>
+          <a:lstStyle/>
+          <a:p>
+            <a:pPr algn="l">
+              <a:lnSpc>
+                <a:spcPct val="95000"/>
+              </a:lnSpc>
+              <a:spcBef>
+                <a:spcPts val="1200"/>
+              </a:spcBef>
+            </a:pPr>
+            <a:r>
+              <a:rPr lang="en-US" sz="1600" i="1" dirty="0">
+                <a:solidFill>
+                  <a:schemeClr val="tx1"/>
+                </a:solidFill>
+                <a:latin typeface="Times New Roman" panose="02020603050405020304" pitchFamily="18" charset="0"/>
+                <a:cs typeface="Times New Roman" panose="02020603050405020304" pitchFamily="18" charset="0"/>
+              </a:rPr>
+              <a:t>x</a:t>
+            </a:r>
+            <a:r>
+              <a:rPr lang="en-US" sz="1600" baseline="-25000" dirty="0">
+                <a:solidFill>
+                  <a:schemeClr val="tx1"/>
+                </a:solidFill>
+                <a:latin typeface="Times New Roman" panose="02020603050405020304" pitchFamily="18" charset="0"/>
+                <a:cs typeface="Times New Roman" panose="02020603050405020304" pitchFamily="18" charset="0"/>
+              </a:rPr>
+              <a:t>2</a:t>
+            </a:r>
+            <a:endParaRPr lang="en-US" sz="1600" dirty="0">
+              <a:solidFill>
+                <a:schemeClr val="tx1"/>
+              </a:solidFill>
+              <a:latin typeface="Times New Roman" panose="02020603050405020304" pitchFamily="18" charset="0"/>
+              <a:cs typeface="Times New Roman" panose="02020603050405020304" pitchFamily="18" charset="0"/>
+            </a:endParaRPr>
+          </a:p>
+        </p:txBody>
+      </p:sp>
+      <p:sp>
+        <p:nvSpPr>
+          <p:cNvPr id="69" name="TextBox 68">
+            <a:extLst>
+              <a:ext uri="{FF2B5EF4-FFF2-40B4-BE49-F238E27FC236}">
+                <a16:creationId xmlns:a16="http://schemas.microsoft.com/office/drawing/2014/main" id="{5FFF636F-D89B-4B90-9F91-0157E8FD5F6E}"/>
+              </a:ext>
+            </a:extLst>
+          </p:cNvPr>
+          <p:cNvSpPr txBox="1"/>
+          <p:nvPr/>
+        </p:nvSpPr>
+        <p:spPr>
+          <a:xfrm>
+            <a:off x="1250415" y="3411872"/>
+            <a:ext cx="479143" cy="418576"/>
+          </a:xfrm>
+          <a:prstGeom prst="rect">
+            <a:avLst/>
+          </a:prstGeom>
+          <a:noFill/>
+          <a:ln>
+            <a:noFill/>
+          </a:ln>
+        </p:spPr>
+        <p:txBody>
+          <a:bodyPr wrap="square" lIns="137160" tIns="91440" rIns="0" bIns="91440" rtlCol="0">
+            <a:spAutoFit/>
+          </a:bodyPr>
+          <a:lstStyle/>
+          <a:p>
+            <a:pPr algn="l">
+              <a:lnSpc>
+                <a:spcPct val="95000"/>
+              </a:lnSpc>
+              <a:spcBef>
+                <a:spcPts val="1200"/>
+              </a:spcBef>
+            </a:pPr>
+            <a:r>
+              <a:rPr lang="en-US" sz="1600" i="1" dirty="0">
+                <a:solidFill>
+                  <a:schemeClr val="tx1"/>
+                </a:solidFill>
+                <a:latin typeface="Times New Roman" panose="02020603050405020304" pitchFamily="18" charset="0"/>
+                <a:cs typeface="Times New Roman" panose="02020603050405020304" pitchFamily="18" charset="0"/>
+              </a:rPr>
+              <a:t>x</a:t>
+            </a:r>
+            <a:r>
+              <a:rPr lang="en-US" sz="1600" baseline="-25000" dirty="0">
+                <a:solidFill>
+                  <a:schemeClr val="tx1"/>
+                </a:solidFill>
+                <a:latin typeface="Times New Roman" panose="02020603050405020304" pitchFamily="18" charset="0"/>
+                <a:cs typeface="Times New Roman" panose="02020603050405020304" pitchFamily="18" charset="0"/>
+              </a:rPr>
+              <a:t>3</a:t>
+            </a:r>
+            <a:endParaRPr lang="en-US" sz="1600" dirty="0">
+              <a:solidFill>
+                <a:schemeClr val="tx1"/>
+              </a:solidFill>
+              <a:latin typeface="Times New Roman" panose="02020603050405020304" pitchFamily="18" charset="0"/>
+              <a:cs typeface="Times New Roman" panose="02020603050405020304" pitchFamily="18" charset="0"/>
+            </a:endParaRPr>
+          </a:p>
+        </p:txBody>
+      </p:sp>
+      <p:sp>
+        <p:nvSpPr>
+          <p:cNvPr id="70" name="TextBox 69">
+            <a:extLst>
+              <a:ext uri="{FF2B5EF4-FFF2-40B4-BE49-F238E27FC236}">
+                <a16:creationId xmlns:a16="http://schemas.microsoft.com/office/drawing/2014/main" id="{87943965-104F-4D1A-A305-67B1942982D1}"/>
+              </a:ext>
+            </a:extLst>
+          </p:cNvPr>
+          <p:cNvSpPr txBox="1"/>
+          <p:nvPr/>
+        </p:nvSpPr>
+        <p:spPr>
+          <a:xfrm>
+            <a:off x="1247161" y="4194087"/>
+            <a:ext cx="479143" cy="418576"/>
+          </a:xfrm>
+          <a:prstGeom prst="rect">
+            <a:avLst/>
+          </a:prstGeom>
+          <a:noFill/>
+          <a:ln>
+            <a:noFill/>
+          </a:ln>
+        </p:spPr>
+        <p:txBody>
+          <a:bodyPr wrap="square" lIns="137160" tIns="91440" rIns="0" bIns="91440" rtlCol="0">
+            <a:spAutoFit/>
+          </a:bodyPr>
+          <a:lstStyle/>
+          <a:p>
+            <a:pPr algn="l">
+              <a:lnSpc>
+                <a:spcPct val="95000"/>
+              </a:lnSpc>
+              <a:spcBef>
+                <a:spcPts val="1200"/>
+              </a:spcBef>
+            </a:pPr>
+            <a:r>
+              <a:rPr lang="en-US" sz="1600" i="1" dirty="0" err="1">
+                <a:solidFill>
+                  <a:schemeClr val="tx1"/>
+                </a:solidFill>
+                <a:latin typeface="Times New Roman" panose="02020603050405020304" pitchFamily="18" charset="0"/>
+                <a:cs typeface="Times New Roman" panose="02020603050405020304" pitchFamily="18" charset="0"/>
+              </a:rPr>
+              <a:t>x</a:t>
+            </a:r>
+            <a:r>
+              <a:rPr lang="en-US" sz="1600" i="1" baseline="-25000" dirty="0" err="1">
+                <a:solidFill>
+                  <a:schemeClr val="tx1"/>
+                </a:solidFill>
+                <a:latin typeface="Times New Roman" panose="02020603050405020304" pitchFamily="18" charset="0"/>
+                <a:cs typeface="Times New Roman" panose="02020603050405020304" pitchFamily="18" charset="0"/>
+              </a:rPr>
+              <a:t>g</a:t>
+            </a:r>
+            <a:endParaRPr lang="en-US" sz="1600" i="1" dirty="0">
+              <a:solidFill>
+                <a:schemeClr val="tx1"/>
+              </a:solidFill>
+              <a:latin typeface="Times New Roman" panose="02020603050405020304" pitchFamily="18" charset="0"/>
+              <a:cs typeface="Times New Roman" panose="02020603050405020304" pitchFamily="18" charset="0"/>
+            </a:endParaRPr>
+          </a:p>
+        </p:txBody>
+      </p:sp>
     </p:spTree>
     <p:extLst>
       <p:ext uri="{BB962C8B-B14F-4D97-AF65-F5344CB8AC3E}">

</xml_diff>